<commit_message>
pushing final edits to paper and PPT
</commit_message>
<xml_diff>
--- a/Stats_FinalProject_Blalock_v0.pptx
+++ b/Stats_FinalProject_Blalock_v0.pptx
@@ -5,15 +5,14 @@
     <p:sldMasterId id="2147483660" r:id="rId1"/>
   </p:sldMasterIdLst>
   <p:notesMasterIdLst>
-    <p:notesMasterId r:id="rId8"/>
+    <p:notesMasterId r:id="rId7"/>
   </p:notesMasterIdLst>
   <p:sldIdLst>
     <p:sldId id="453" r:id="rId2"/>
     <p:sldId id="539" r:id="rId3"/>
-    <p:sldId id="455" r:id="rId4"/>
-    <p:sldId id="542" r:id="rId5"/>
-    <p:sldId id="541" r:id="rId6"/>
-    <p:sldId id="267" r:id="rId7"/>
+    <p:sldId id="542" r:id="rId4"/>
+    <p:sldId id="541" r:id="rId5"/>
+    <p:sldId id="267" r:id="rId6"/>
   </p:sldIdLst>
   <p:sldSz cx="12192000" cy="6858000"/>
   <p:notesSz cx="6858000" cy="9144000"/>
@@ -209,7 +208,7 @@
           <a:p>
             <a:fld id="{EEE03F8B-A50D-DE44-9304-39C43FB3C5B0}" type="datetimeFigureOut">
               <a:rPr lang="en-US" smtClean="0"/>
-              <a:t>12/11/23</a:t>
+              <a:t>12/13/23</a:t>
             </a:fld>
             <a:endParaRPr lang="en-US"/>
           </a:p>
@@ -4002,6 +4001,339 @@
                                           </p:stCondLst>
                                         </p:cTn>
                                         <p:tgtEl>
+                                          <p:spTgt spid="2050"/>
+                                        </p:tgtEl>
+                                        <p:attrNameLst>
+                                          <p:attrName>style.visibility</p:attrName>
+                                        </p:attrNameLst>
+                                      </p:cBhvr>
+                                      <p:to>
+                                        <p:strVal val="visible"/>
+                                      </p:to>
+                                    </p:set>
+                                  </p:childTnLst>
+                                </p:cTn>
+                              </p:par>
+                              <p:par>
+                                <p:cTn id="7" presetID="1" presetClass="entr" presetSubtype="0" fill="hold" nodeType="withEffect">
+                                  <p:stCondLst>
+                                    <p:cond delay="0"/>
+                                  </p:stCondLst>
+                                  <p:childTnLst>
+                                    <p:set>
+                                      <p:cBhvr>
+                                        <p:cTn id="8" dur="1" fill="hold">
+                                          <p:stCondLst>
+                                            <p:cond delay="0"/>
+                                          </p:stCondLst>
+                                        </p:cTn>
+                                        <p:tgtEl>
+                                          <p:spTgt spid="6"/>
+                                        </p:tgtEl>
+                                        <p:attrNameLst>
+                                          <p:attrName>style.visibility</p:attrName>
+                                        </p:attrNameLst>
+                                      </p:cBhvr>
+                                      <p:to>
+                                        <p:strVal val="visible"/>
+                                      </p:to>
+                                    </p:set>
+                                  </p:childTnLst>
+                                </p:cTn>
+                              </p:par>
+                              <p:par>
+                                <p:cTn id="9" presetID="1" presetClass="entr" presetSubtype="0" fill="hold" nodeType="withEffect">
+                                  <p:stCondLst>
+                                    <p:cond delay="0"/>
+                                  </p:stCondLst>
+                                  <p:childTnLst>
+                                    <p:set>
+                                      <p:cBhvr>
+                                        <p:cTn id="10" dur="1" fill="hold">
+                                          <p:stCondLst>
+                                            <p:cond delay="0"/>
+                                          </p:stCondLst>
+                                        </p:cTn>
+                                        <p:tgtEl>
+                                          <p:spTgt spid="2052"/>
+                                        </p:tgtEl>
+                                        <p:attrNameLst>
+                                          <p:attrName>style.visibility</p:attrName>
+                                        </p:attrNameLst>
+                                      </p:cBhvr>
+                                      <p:to>
+                                        <p:strVal val="visible"/>
+                                      </p:to>
+                                    </p:set>
+                                  </p:childTnLst>
+                                </p:cTn>
+                              </p:par>
+                              <p:par>
+                                <p:cTn id="11" presetID="1" presetClass="entr" presetSubtype="0" fill="hold" grpId="0" nodeType="withEffect">
+                                  <p:stCondLst>
+                                    <p:cond delay="0"/>
+                                  </p:stCondLst>
+                                  <p:childTnLst>
+                                    <p:set>
+                                      <p:cBhvr>
+                                        <p:cTn id="12" dur="1" fill="hold">
+                                          <p:stCondLst>
+                                            <p:cond delay="0"/>
+                                          </p:stCondLst>
+                                        </p:cTn>
+                                        <p:tgtEl>
+                                          <p:spTgt spid="15"/>
+                                        </p:tgtEl>
+                                        <p:attrNameLst>
+                                          <p:attrName>style.visibility</p:attrName>
+                                        </p:attrNameLst>
+                                      </p:cBhvr>
+                                      <p:to>
+                                        <p:strVal val="visible"/>
+                                      </p:to>
+                                    </p:set>
+                                  </p:childTnLst>
+                                </p:cTn>
+                              </p:par>
+                              <p:par>
+                                <p:cTn id="13" presetID="1" presetClass="entr" presetSubtype="0" fill="hold" nodeType="withEffect">
+                                  <p:stCondLst>
+                                    <p:cond delay="0"/>
+                                  </p:stCondLst>
+                                  <p:childTnLst>
+                                    <p:set>
+                                      <p:cBhvr>
+                                        <p:cTn id="14" dur="1" fill="hold">
+                                          <p:stCondLst>
+                                            <p:cond delay="0"/>
+                                          </p:stCondLst>
+                                        </p:cTn>
+                                        <p:tgtEl>
+                                          <p:spTgt spid="16"/>
+                                        </p:tgtEl>
+                                        <p:attrNameLst>
+                                          <p:attrName>style.visibility</p:attrName>
+                                        </p:attrNameLst>
+                                      </p:cBhvr>
+                                      <p:to>
+                                        <p:strVal val="visible"/>
+                                      </p:to>
+                                    </p:set>
+                                  </p:childTnLst>
+                                </p:cTn>
+                              </p:par>
+                              <p:par>
+                                <p:cTn id="15" presetID="1" presetClass="entr" presetSubtype="0" fill="hold" nodeType="withEffect">
+                                  <p:stCondLst>
+                                    <p:cond delay="0"/>
+                                  </p:stCondLst>
+                                  <p:childTnLst>
+                                    <p:set>
+                                      <p:cBhvr>
+                                        <p:cTn id="16" dur="1" fill="hold">
+                                          <p:stCondLst>
+                                            <p:cond delay="0"/>
+                                          </p:stCondLst>
+                                        </p:cTn>
+                                        <p:tgtEl>
+                                          <p:spTgt spid="35"/>
+                                        </p:tgtEl>
+                                        <p:attrNameLst>
+                                          <p:attrName>style.visibility</p:attrName>
+                                        </p:attrNameLst>
+                                      </p:cBhvr>
+                                      <p:to>
+                                        <p:strVal val="visible"/>
+                                      </p:to>
+                                    </p:set>
+                                  </p:childTnLst>
+                                </p:cTn>
+                              </p:par>
+                            </p:childTnLst>
+                          </p:cTn>
+                        </p:par>
+                      </p:childTnLst>
+                    </p:cTn>
+                  </p:par>
+                  <p:par>
+                    <p:cTn id="17" fill="hold">
+                      <p:stCondLst>
+                        <p:cond delay="indefinite"/>
+                      </p:stCondLst>
+                      <p:childTnLst>
+                        <p:par>
+                          <p:cTn id="18" fill="hold">
+                            <p:stCondLst>
+                              <p:cond delay="0"/>
+                            </p:stCondLst>
+                            <p:childTnLst>
+                              <p:par>
+                                <p:cTn id="19" presetID="1" presetClass="entr" presetSubtype="0" fill="hold" nodeType="clickEffect">
+                                  <p:stCondLst>
+                                    <p:cond delay="0"/>
+                                  </p:stCondLst>
+                                  <p:childTnLst>
+                                    <p:set>
+                                      <p:cBhvr>
+                                        <p:cTn id="20" dur="1" fill="hold">
+                                          <p:stCondLst>
+                                            <p:cond delay="0"/>
+                                          </p:stCondLst>
+                                        </p:cTn>
+                                        <p:tgtEl>
+                                          <p:spTgt spid="3"/>
+                                        </p:tgtEl>
+                                        <p:attrNameLst>
+                                          <p:attrName>style.visibility</p:attrName>
+                                        </p:attrNameLst>
+                                      </p:cBhvr>
+                                      <p:to>
+                                        <p:strVal val="visible"/>
+                                      </p:to>
+                                    </p:set>
+                                  </p:childTnLst>
+                                </p:cTn>
+                              </p:par>
+                              <p:par>
+                                <p:cTn id="21" presetID="1" presetClass="entr" presetSubtype="0" fill="hold" nodeType="withEffect">
+                                  <p:stCondLst>
+                                    <p:cond delay="0"/>
+                                  </p:stCondLst>
+                                  <p:childTnLst>
+                                    <p:set>
+                                      <p:cBhvr>
+                                        <p:cTn id="22" dur="1" fill="hold">
+                                          <p:stCondLst>
+                                            <p:cond delay="0"/>
+                                          </p:stCondLst>
+                                        </p:cTn>
+                                        <p:tgtEl>
+                                          <p:spTgt spid="7"/>
+                                        </p:tgtEl>
+                                        <p:attrNameLst>
+                                          <p:attrName>style.visibility</p:attrName>
+                                        </p:attrNameLst>
+                                      </p:cBhvr>
+                                      <p:to>
+                                        <p:strVal val="visible"/>
+                                      </p:to>
+                                    </p:set>
+                                  </p:childTnLst>
+                                </p:cTn>
+                              </p:par>
+                              <p:par>
+                                <p:cTn id="23" presetID="1" presetClass="entr" presetSubtype="0" fill="hold" grpId="0" nodeType="withEffect">
+                                  <p:stCondLst>
+                                    <p:cond delay="0"/>
+                                  </p:stCondLst>
+                                  <p:childTnLst>
+                                    <p:set>
+                                      <p:cBhvr>
+                                        <p:cTn id="24" dur="1" fill="hold">
+                                          <p:stCondLst>
+                                            <p:cond delay="0"/>
+                                          </p:stCondLst>
+                                        </p:cTn>
+                                        <p:tgtEl>
+                                          <p:spTgt spid="10"/>
+                                        </p:tgtEl>
+                                        <p:attrNameLst>
+                                          <p:attrName>style.visibility</p:attrName>
+                                        </p:attrNameLst>
+                                      </p:cBhvr>
+                                      <p:to>
+                                        <p:strVal val="visible"/>
+                                      </p:to>
+                                    </p:set>
+                                  </p:childTnLst>
+                                </p:cTn>
+                              </p:par>
+                              <p:par>
+                                <p:cTn id="25" presetID="1" presetClass="entr" presetSubtype="0" fill="hold" nodeType="withEffect">
+                                  <p:stCondLst>
+                                    <p:cond delay="0"/>
+                                  </p:stCondLst>
+                                  <p:childTnLst>
+                                    <p:set>
+                                      <p:cBhvr>
+                                        <p:cTn id="26" dur="1" fill="hold">
+                                          <p:stCondLst>
+                                            <p:cond delay="0"/>
+                                          </p:stCondLst>
+                                        </p:cTn>
+                                        <p:tgtEl>
+                                          <p:spTgt spid="11"/>
+                                        </p:tgtEl>
+                                        <p:attrNameLst>
+                                          <p:attrName>style.visibility</p:attrName>
+                                        </p:attrNameLst>
+                                      </p:cBhvr>
+                                      <p:to>
+                                        <p:strVal val="visible"/>
+                                      </p:to>
+                                    </p:set>
+                                  </p:childTnLst>
+                                </p:cTn>
+                              </p:par>
+                              <p:par>
+                                <p:cTn id="27" presetID="1" presetClass="entr" presetSubtype="0" fill="hold" nodeType="withEffect">
+                                  <p:stCondLst>
+                                    <p:cond delay="0"/>
+                                  </p:stCondLst>
+                                  <p:childTnLst>
+                                    <p:set>
+                                      <p:cBhvr>
+                                        <p:cTn id="28" dur="1" fill="hold">
+                                          <p:stCondLst>
+                                            <p:cond delay="0"/>
+                                          </p:stCondLst>
+                                        </p:cTn>
+                                        <p:tgtEl>
+                                          <p:spTgt spid="38"/>
+                                        </p:tgtEl>
+                                        <p:attrNameLst>
+                                          <p:attrName>style.visibility</p:attrName>
+                                        </p:attrNameLst>
+                                      </p:cBhvr>
+                                      <p:to>
+                                        <p:strVal val="visible"/>
+                                      </p:to>
+                                    </p:set>
+                                  </p:childTnLst>
+                                </p:cTn>
+                              </p:par>
+                            </p:childTnLst>
+                          </p:cTn>
+                        </p:par>
+                      </p:childTnLst>
+                    </p:cTn>
+                  </p:par>
+                  <p:par>
+                    <p:cTn id="29" fill="hold">
+                      <p:stCondLst>
+                        <p:cond delay="indefinite"/>
+                      </p:stCondLst>
+                      <p:childTnLst>
+                        <p:par>
+                          <p:cTn id="30" fill="hold">
+                            <p:stCondLst>
+                              <p:cond delay="0"/>
+                            </p:stCondLst>
+                            <p:childTnLst>
+                              <p:par>
+                                <p:cTn id="31" presetID="1" presetClass="entr" presetSubtype="0" fill="hold" nodeType="clickEffect">
+                                  <p:stCondLst>
+                                    <p:cond delay="0"/>
+                                  </p:stCondLst>
+                                  <p:childTnLst>
+                                    <p:set>
+                                      <p:cBhvr>
+                                        <p:cTn id="32" dur="1" fill="hold">
+                                          <p:stCondLst>
+                                            <p:cond delay="0"/>
+                                          </p:stCondLst>
+                                        </p:cTn>
+                                        <p:tgtEl>
                                           <p:spTgt spid="50"/>
                                         </p:tgtEl>
                                         <p:attrNameLst>
@@ -4042,404 +4374,15 @@
         </p:cTn>
       </p:par>
     </p:tnLst>
+    <p:bldLst>
+      <p:bldP spid="10" grpId="0"/>
+      <p:bldP spid="15" grpId="0"/>
+    </p:bldLst>
   </p:timing>
 </p:sld>
 </file>
 
 <file path=ppt/slides/slide3.xml><?xml version="1.0" encoding="utf-8"?>
-<p:sld xmlns:a="http://schemas.openxmlformats.org/drawingml/2006/main" xmlns:r="http://schemas.openxmlformats.org/officeDocument/2006/relationships" xmlns:p="http://schemas.openxmlformats.org/presentationml/2006/main">
-  <p:cSld>
-    <p:spTree>
-      <p:nvGrpSpPr>
-        <p:cNvPr id="1" name=""/>
-        <p:cNvGrpSpPr/>
-        <p:nvPr/>
-      </p:nvGrpSpPr>
-      <p:grpSpPr>
-        <a:xfrm>
-          <a:off x="0" y="0"/>
-          <a:ext cx="0" cy="0"/>
-          <a:chOff x="0" y="0"/>
-          <a:chExt cx="0" cy="0"/>
-        </a:xfrm>
-      </p:grpSpPr>
-      <p:sp>
-        <p:nvSpPr>
-          <p:cNvPr id="2" name="Text Placeholder 1">
-            <a:extLst>
-              <a:ext uri="{FF2B5EF4-FFF2-40B4-BE49-F238E27FC236}">
-                <a16:creationId xmlns:a16="http://schemas.microsoft.com/office/drawing/2014/main" id="{51E4C8D8-845A-F0B1-552A-91CF22338B41}"/>
-              </a:ext>
-            </a:extLst>
-          </p:cNvPr>
-          <p:cNvSpPr>
-            <a:spLocks noGrp="1"/>
-          </p:cNvSpPr>
-          <p:nvPr>
-            <p:ph type="body" sz="quarter" idx="12"/>
-          </p:nvPr>
-        </p:nvSpPr>
-        <p:spPr>
-          <a:xfrm>
-            <a:off x="457200" y="311259"/>
-            <a:ext cx="10896600" cy="907941"/>
-          </a:xfrm>
-        </p:spPr>
-        <p:txBody>
-          <a:bodyPr/>
-          <a:lstStyle/>
-          <a:p>
-            <a:pPr indent="0">
-              <a:lnSpc>
-                <a:spcPct val="100000"/>
-              </a:lnSpc>
-              <a:spcBef>
-                <a:spcPts val="0"/>
-              </a:spcBef>
-            </a:pPr>
-            <a:r>
-              <a:rPr lang="en-US" sz="2800" dirty="0"/>
-              <a:t>Principal Components from PCA of Multiple Sequence Alignment Discretely Separate Most Fluorescent Proteins</a:t>
-            </a:r>
-          </a:p>
-        </p:txBody>
-      </p:sp>
-      <p:grpSp>
-        <p:nvGrpSpPr>
-          <p:cNvPr id="11" name="Group 10">
-            <a:extLst>
-              <a:ext uri="{FF2B5EF4-FFF2-40B4-BE49-F238E27FC236}">
-                <a16:creationId xmlns:a16="http://schemas.microsoft.com/office/drawing/2014/main" id="{A9708824-3D35-F77A-22CF-E9D8BB671DAB}"/>
-              </a:ext>
-            </a:extLst>
-          </p:cNvPr>
-          <p:cNvGrpSpPr/>
-          <p:nvPr/>
-        </p:nvGrpSpPr>
-        <p:grpSpPr>
-          <a:xfrm>
-            <a:off x="222838" y="2955537"/>
-            <a:ext cx="11746323" cy="3504765"/>
-            <a:chOff x="370572" y="2109754"/>
-            <a:chExt cx="11746323" cy="3504765"/>
-          </a:xfrm>
-        </p:grpSpPr>
-        <p:pic>
-          <p:nvPicPr>
-            <p:cNvPr id="5" name="Picture 4" descr="A graph with a dotted line&#10;&#10;Description automatically generated">
-              <a:extLst>
-                <a:ext uri="{FF2B5EF4-FFF2-40B4-BE49-F238E27FC236}">
-                  <a16:creationId xmlns:a16="http://schemas.microsoft.com/office/drawing/2014/main" id="{99699692-2E8C-C52E-C0EA-1F9B378535F1}"/>
-                </a:ext>
-              </a:extLst>
-            </p:cNvPr>
-            <p:cNvPicPr>
-              <a:picLocks noChangeAspect="1"/>
-            </p:cNvPicPr>
-            <p:nvPr/>
-          </p:nvPicPr>
-          <p:blipFill rotWithShape="1">
-            <a:blip r:embed="rId2" cstate="print">
-              <a:extLst>
-                <a:ext uri="{28A0092B-C50C-407E-A947-70E740481C1C}">
-                  <a14:useLocalDpi xmlns:a14="http://schemas.microsoft.com/office/drawing/2010/main" val="0"/>
-                </a:ext>
-              </a:extLst>
-            </a:blip>
-            <a:srcRect r="4108"/>
-            <a:stretch/>
-          </p:blipFill>
-          <p:spPr>
-            <a:xfrm>
-              <a:off x="370572" y="2109754"/>
-              <a:ext cx="4774536" cy="3485515"/>
-            </a:xfrm>
-            <a:prstGeom prst="rect">
-              <a:avLst/>
-            </a:prstGeom>
-          </p:spPr>
-        </p:pic>
-        <p:pic>
-          <p:nvPicPr>
-            <p:cNvPr id="6" name="Picture 5" descr="A graph of different colored lines&#10;&#10;Description automatically generated with medium confidence">
-              <a:extLst>
-                <a:ext uri="{FF2B5EF4-FFF2-40B4-BE49-F238E27FC236}">
-                  <a16:creationId xmlns:a16="http://schemas.microsoft.com/office/drawing/2014/main" id="{34283220-17B6-4B8E-E579-CAB42CED431E}"/>
-                </a:ext>
-              </a:extLst>
-            </p:cNvPr>
-            <p:cNvPicPr>
-              <a:picLocks noChangeAspect="1"/>
-            </p:cNvPicPr>
-            <p:nvPr/>
-          </p:nvPicPr>
-          <p:blipFill>
-            <a:blip r:embed="rId3">
-              <a:extLst>
-                <a:ext uri="{28A0092B-C50C-407E-A947-70E740481C1C}">
-                  <a14:useLocalDpi xmlns:a14="http://schemas.microsoft.com/office/drawing/2010/main" val="0"/>
-                </a:ext>
-              </a:extLst>
-            </a:blip>
-            <a:stretch>
-              <a:fillRect/>
-            </a:stretch>
-          </p:blipFill>
-          <p:spPr>
-            <a:xfrm>
-              <a:off x="5145108" y="2129005"/>
-              <a:ext cx="6971787" cy="3485514"/>
-            </a:xfrm>
-            <a:prstGeom prst="rect">
-              <a:avLst/>
-            </a:prstGeom>
-          </p:spPr>
-        </p:pic>
-        <p:sp>
-          <p:nvSpPr>
-            <p:cNvPr id="7" name="Oval 6">
-              <a:extLst>
-                <a:ext uri="{FF2B5EF4-FFF2-40B4-BE49-F238E27FC236}">
-                  <a16:creationId xmlns:a16="http://schemas.microsoft.com/office/drawing/2014/main" id="{E4019071-0C41-B434-223D-47828A3D8B79}"/>
-                </a:ext>
-              </a:extLst>
-            </p:cNvPr>
-            <p:cNvSpPr/>
-            <p:nvPr/>
-          </p:nvSpPr>
-          <p:spPr>
-            <a:xfrm>
-              <a:off x="7641931" y="2252892"/>
-              <a:ext cx="382044" cy="382044"/>
-            </a:xfrm>
-            <a:prstGeom prst="ellipse">
-              <a:avLst/>
-            </a:prstGeom>
-            <a:noFill/>
-            <a:ln>
-              <a:solidFill>
-                <a:srgbClr val="00B050"/>
-              </a:solidFill>
-            </a:ln>
-          </p:spPr>
-          <p:style>
-            <a:lnRef idx="2">
-              <a:schemeClr val="accent1">
-                <a:shade val="15000"/>
-              </a:schemeClr>
-            </a:lnRef>
-            <a:fillRef idx="1">
-              <a:schemeClr val="accent1"/>
-            </a:fillRef>
-            <a:effectRef idx="0">
-              <a:schemeClr val="accent1"/>
-            </a:effectRef>
-            <a:fontRef idx="minor">
-              <a:schemeClr val="lt1"/>
-            </a:fontRef>
-          </p:style>
-          <p:txBody>
-            <a:bodyPr rtlCol="0" anchor="ctr"/>
-            <a:lstStyle/>
-            <a:p>
-              <a:pPr algn="ctr"/>
-              <a:endParaRPr lang="en-US"/>
-            </a:p>
-          </p:txBody>
-        </p:sp>
-        <p:sp>
-          <p:nvSpPr>
-            <p:cNvPr id="8" name="Oval 7">
-              <a:extLst>
-                <a:ext uri="{FF2B5EF4-FFF2-40B4-BE49-F238E27FC236}">
-                  <a16:creationId xmlns:a16="http://schemas.microsoft.com/office/drawing/2014/main" id="{C9766A63-3C52-4F26-8ACB-4C2508DF3A2E}"/>
-                </a:ext>
-              </a:extLst>
-            </p:cNvPr>
-            <p:cNvSpPr/>
-            <p:nvPr/>
-          </p:nvSpPr>
-          <p:spPr>
-            <a:xfrm>
-              <a:off x="5596013" y="5033669"/>
-              <a:ext cx="204592" cy="208767"/>
-            </a:xfrm>
-            <a:prstGeom prst="ellipse">
-              <a:avLst/>
-            </a:prstGeom>
-            <a:noFill/>
-            <a:ln>
-              <a:solidFill>
-                <a:srgbClr val="00B050"/>
-              </a:solidFill>
-            </a:ln>
-          </p:spPr>
-          <p:style>
-            <a:lnRef idx="2">
-              <a:schemeClr val="accent1">
-                <a:shade val="15000"/>
-              </a:schemeClr>
-            </a:lnRef>
-            <a:fillRef idx="1">
-              <a:schemeClr val="accent1"/>
-            </a:fillRef>
-            <a:effectRef idx="0">
-              <a:schemeClr val="accent1"/>
-            </a:effectRef>
-            <a:fontRef idx="minor">
-              <a:schemeClr val="lt1"/>
-            </a:fontRef>
-          </p:style>
-          <p:txBody>
-            <a:bodyPr rtlCol="0" anchor="ctr"/>
-            <a:lstStyle/>
-            <a:p>
-              <a:pPr algn="ctr"/>
-              <a:endParaRPr lang="en-US"/>
-            </a:p>
-          </p:txBody>
-        </p:sp>
-      </p:grpSp>
-      <p:pic>
-        <p:nvPicPr>
-          <p:cNvPr id="15" name="Picture 2">
-            <a:extLst>
-              <a:ext uri="{FF2B5EF4-FFF2-40B4-BE49-F238E27FC236}">
-                <a16:creationId xmlns:a16="http://schemas.microsoft.com/office/drawing/2014/main" id="{251BC744-A522-BEE4-A198-794A00B48386}"/>
-              </a:ext>
-            </a:extLst>
-          </p:cNvPr>
-          <p:cNvPicPr>
-            <a:picLocks noChangeAspect="1" noChangeArrowheads="1"/>
-          </p:cNvPicPr>
-          <p:nvPr/>
-        </p:nvPicPr>
-        <p:blipFill rotWithShape="1">
-          <a:blip r:embed="rId4">
-            <a:extLst>
-              <a:ext uri="{28A0092B-C50C-407E-A947-70E740481C1C}">
-                <a14:useLocalDpi xmlns:a14="http://schemas.microsoft.com/office/drawing/2010/main" val="0"/>
-              </a:ext>
-            </a:extLst>
-          </a:blip>
-          <a:srcRect t="5832" r="63340" b="6746"/>
-          <a:stretch/>
-        </p:blipFill>
-        <p:spPr bwMode="auto">
-          <a:xfrm>
-            <a:off x="457200" y="1511748"/>
-            <a:ext cx="1863523" cy="1395664"/>
-          </a:xfrm>
-          <a:prstGeom prst="rect">
-            <a:avLst/>
-          </a:prstGeom>
-          <a:noFill/>
-          <a:extLst>
-            <a:ext uri="{909E8E84-426E-40DD-AFC4-6F175D3DCCD1}">
-              <a14:hiddenFill xmlns:a14="http://schemas.microsoft.com/office/drawing/2010/main">
-                <a:solidFill>
-                  <a:srgbClr val="FFFFFF"/>
-                </a:solidFill>
-              </a14:hiddenFill>
-            </a:ext>
-          </a:extLst>
-        </p:spPr>
-      </p:pic>
-      <p:pic>
-        <p:nvPicPr>
-          <p:cNvPr id="16" name="Picture 2">
-            <a:extLst>
-              <a:ext uri="{FF2B5EF4-FFF2-40B4-BE49-F238E27FC236}">
-                <a16:creationId xmlns:a16="http://schemas.microsoft.com/office/drawing/2014/main" id="{E2FF2D5D-2AA4-3B82-9C26-06E88A21B8F8}"/>
-              </a:ext>
-            </a:extLst>
-          </p:cNvPr>
-          <p:cNvPicPr>
-            <a:picLocks noChangeAspect="1" noChangeArrowheads="1"/>
-          </p:cNvPicPr>
-          <p:nvPr/>
-        </p:nvPicPr>
-        <p:blipFill rotWithShape="1">
-          <a:blip r:embed="rId4">
-            <a:extLst>
-              <a:ext uri="{28A0092B-C50C-407E-A947-70E740481C1C}">
-                <a14:useLocalDpi xmlns:a14="http://schemas.microsoft.com/office/drawing/2010/main" val="0"/>
-              </a:ext>
-            </a:extLst>
-          </a:blip>
-          <a:srcRect l="68800"/>
-          <a:stretch/>
-        </p:blipFill>
-        <p:spPr bwMode="auto">
-          <a:xfrm>
-            <a:off x="5302992" y="1411343"/>
-            <a:ext cx="1586015" cy="1596473"/>
-          </a:xfrm>
-          <a:prstGeom prst="rect">
-            <a:avLst/>
-          </a:prstGeom>
-          <a:noFill/>
-          <a:extLst>
-            <a:ext uri="{909E8E84-426E-40DD-AFC4-6F175D3DCCD1}">
-              <a14:hiddenFill xmlns:a14="http://schemas.microsoft.com/office/drawing/2010/main">
-                <a:solidFill>
-                  <a:srgbClr val="FFFFFF"/>
-                </a:solidFill>
-              </a14:hiddenFill>
-            </a:ext>
-          </a:extLst>
-        </p:spPr>
-      </p:pic>
-      <p:pic>
-        <p:nvPicPr>
-          <p:cNvPr id="17" name="Picture 16">
-            <a:extLst>
-              <a:ext uri="{FF2B5EF4-FFF2-40B4-BE49-F238E27FC236}">
-                <a16:creationId xmlns:a16="http://schemas.microsoft.com/office/drawing/2014/main" id="{9F1C457B-7A78-1CC1-502A-8D9C4B36789B}"/>
-              </a:ext>
-            </a:extLst>
-          </p:cNvPr>
-          <p:cNvPicPr>
-            <a:picLocks noChangeAspect="1"/>
-          </p:cNvPicPr>
-          <p:nvPr/>
-        </p:nvPicPr>
-        <p:blipFill>
-          <a:blip r:embed="rId5" cstate="print">
-            <a:extLst>
-              <a:ext uri="{28A0092B-C50C-407E-A947-70E740481C1C}">
-                <a14:useLocalDpi xmlns:a14="http://schemas.microsoft.com/office/drawing/2010/main" val="0"/>
-              </a:ext>
-            </a:extLst>
-          </a:blip>
-          <a:stretch>
-            <a:fillRect/>
-          </a:stretch>
-        </p:blipFill>
-        <p:spPr>
-          <a:xfrm>
-            <a:off x="4997374" y="3687786"/>
-            <a:ext cx="6640323" cy="539881"/>
-          </a:xfrm>
-          <a:prstGeom prst="rect">
-            <a:avLst/>
-          </a:prstGeom>
-        </p:spPr>
-      </p:pic>
-    </p:spTree>
-    <p:extLst>
-      <p:ext uri="{BB962C8B-B14F-4D97-AF65-F5344CB8AC3E}">
-        <p14:creationId xmlns:p14="http://schemas.microsoft.com/office/powerpoint/2010/main" val="1874438261"/>
-      </p:ext>
-    </p:extLst>
-  </p:cSld>
-  <p:clrMapOvr>
-    <a:masterClrMapping/>
-  </p:clrMapOvr>
-</p:sld>
-</file>
-
-<file path=ppt/slides/slide4.xml><?xml version="1.0" encoding="utf-8"?>
 <p:sld xmlns:a="http://schemas.openxmlformats.org/drawingml/2006/main" xmlns:r="http://schemas.openxmlformats.org/officeDocument/2006/relationships" xmlns:p="http://schemas.openxmlformats.org/presentationml/2006/main">
   <p:cSld>
     <p:spTree>
@@ -4823,7 +4766,7 @@
 </p:sld>
 </file>
 
-<file path=ppt/slides/slide5.xml><?xml version="1.0" encoding="utf-8"?>
+<file path=ppt/slides/slide4.xml><?xml version="1.0" encoding="utf-8"?>
 <p:sld xmlns:a="http://schemas.openxmlformats.org/drawingml/2006/main" xmlns:r="http://schemas.openxmlformats.org/officeDocument/2006/relationships" xmlns:p="http://schemas.openxmlformats.org/presentationml/2006/main">
   <p:cSld>
     <p:spTree>
@@ -4858,8 +4801,8 @@
         </p:nvSpPr>
         <p:spPr>
           <a:xfrm>
-            <a:off x="457200" y="231237"/>
-            <a:ext cx="10896600" cy="987963"/>
+            <a:off x="457200" y="397437"/>
+            <a:ext cx="10896600" cy="821763"/>
           </a:xfrm>
         </p:spPr>
         <p:txBody>
@@ -4867,83 +4810,149 @@
           <a:lstStyle/>
           <a:p>
             <a:r>
-              <a:rPr lang="en-US" dirty="0"/>
-              <a:t>PCA interpretability may provide meaningful insight for protein design</a:t>
+              <a:rPr lang="en-US" sz="2800" dirty="0">
+                <a:effectLst/>
+                <a:latin typeface="ArialMT"/>
+              </a:rPr>
+              <a:t>Interpreting the contribution of amino acid positions to principal components may prove meaningful for protein design </a:t>
             </a:r>
+            <a:endParaRPr lang="en-US" sz="4400" dirty="0"/>
           </a:p>
         </p:txBody>
       </p:sp>
-      <p:pic>
-        <p:nvPicPr>
-          <p:cNvPr id="5" name="Picture 4" descr="A table with numbers and letters&#10;&#10;Description automatically generated">
+      <p:grpSp>
+        <p:nvGrpSpPr>
+          <p:cNvPr id="14" name="Group 13">
             <a:extLst>
               <a:ext uri="{FF2B5EF4-FFF2-40B4-BE49-F238E27FC236}">
-                <a16:creationId xmlns:a16="http://schemas.microsoft.com/office/drawing/2014/main" id="{A59C59C0-9C5E-3941-6784-E78043FC1EE7}"/>
+                <a16:creationId xmlns:a16="http://schemas.microsoft.com/office/drawing/2014/main" id="{433B03C3-BAA3-5C73-C0BD-F24AF1410C55}"/>
               </a:ext>
             </a:extLst>
           </p:cNvPr>
-          <p:cNvPicPr>
-            <a:picLocks noChangeAspect="1"/>
-          </p:cNvPicPr>
-          <p:nvPr/>
-        </p:nvPicPr>
-        <p:blipFill rotWithShape="1">
-          <a:blip r:embed="rId2">
-            <a:extLst>
-              <a:ext uri="{28A0092B-C50C-407E-A947-70E740481C1C}">
-                <a14:useLocalDpi xmlns:a14="http://schemas.microsoft.com/office/drawing/2010/main" val="0"/>
-              </a:ext>
-            </a:extLst>
-          </a:blip>
-          <a:srcRect r="25590"/>
-          <a:stretch/>
-        </p:blipFill>
-        <p:spPr bwMode="auto">
-          <a:xfrm>
-            <a:off x="1693745" y="4171584"/>
-            <a:ext cx="3609596" cy="1530019"/>
-          </a:xfrm>
-          <a:prstGeom prst="rect">
-            <a:avLst/>
-          </a:prstGeom>
-          <a:ln>
-            <a:noFill/>
-          </a:ln>
-          <a:extLst>
-            <a:ext uri="{53640926-AAD7-44D8-BBD7-CCE9431645EC}">
-              <a14:shadowObscured xmlns:a14="http://schemas.microsoft.com/office/drawing/2010/main"/>
-            </a:ext>
-          </a:extLst>
-        </p:spPr>
-      </p:pic>
-      <p:grpSp>
-        <p:nvGrpSpPr>
-          <p:cNvPr id="10" name="Group 9">
-            <a:extLst>
-              <a:ext uri="{FF2B5EF4-FFF2-40B4-BE49-F238E27FC236}">
-                <a16:creationId xmlns:a16="http://schemas.microsoft.com/office/drawing/2014/main" id="{C407AAEE-75E5-BF0D-FE02-C93CA73F66DA}"/>
-              </a:ext>
-            </a:extLst>
-          </p:cNvPr>
-          <p:cNvGrpSpPr>
-            <a:grpSpLocks noChangeAspect="1"/>
-          </p:cNvGrpSpPr>
+          <p:cNvGrpSpPr/>
           <p:nvPr/>
         </p:nvGrpSpPr>
         <p:grpSpPr>
           <a:xfrm>
-            <a:off x="457200" y="2024752"/>
-            <a:ext cx="6460091" cy="2011680"/>
-            <a:chOff x="5693342" y="1806063"/>
-            <a:chExt cx="5872810" cy="1828800"/>
+            <a:off x="714127" y="2319944"/>
+            <a:ext cx="10763745" cy="2500860"/>
+            <a:chOff x="844816" y="2349761"/>
+            <a:chExt cx="10763745" cy="2500860"/>
           </a:xfrm>
         </p:grpSpPr>
+        <p:grpSp>
+          <p:nvGrpSpPr>
+            <p:cNvPr id="13" name="Group 12">
+              <a:extLst>
+                <a:ext uri="{FF2B5EF4-FFF2-40B4-BE49-F238E27FC236}">
+                  <a16:creationId xmlns:a16="http://schemas.microsoft.com/office/drawing/2014/main" id="{31D95AF5-049A-BE7A-567E-3F13F7B4CBFC}"/>
+                </a:ext>
+              </a:extLst>
+            </p:cNvPr>
+            <p:cNvGrpSpPr/>
+            <p:nvPr/>
+          </p:nvGrpSpPr>
+          <p:grpSpPr>
+            <a:xfrm>
+              <a:off x="5139404" y="2830607"/>
+              <a:ext cx="6469157" cy="2020014"/>
+              <a:chOff x="3847318" y="3067271"/>
+              <a:chExt cx="6469157" cy="2020014"/>
+            </a:xfrm>
+          </p:grpSpPr>
+          <p:pic>
+            <p:nvPicPr>
+              <p:cNvPr id="4" name="Picture 3" descr="A graph of a graph showing different types of molecules&#10;&#10;Description automatically generated with medium confidence">
+                <a:extLst>
+                  <a:ext uri="{FF2B5EF4-FFF2-40B4-BE49-F238E27FC236}">
+                    <a16:creationId xmlns:a16="http://schemas.microsoft.com/office/drawing/2014/main" id="{25EAF043-CFC7-AB29-1AB6-FF1573252C10}"/>
+                  </a:ext>
+                </a:extLst>
+              </p:cNvPr>
+              <p:cNvPicPr>
+                <a:picLocks noChangeAspect="1"/>
+              </p:cNvPicPr>
+              <p:nvPr/>
+            </p:nvPicPr>
+            <p:blipFill rotWithShape="1">
+              <a:blip r:embed="rId2" cstate="print">
+                <a:extLst>
+                  <a:ext uri="{28A0092B-C50C-407E-A947-70E740481C1C}">
+                    <a14:useLocalDpi xmlns:a14="http://schemas.microsoft.com/office/drawing/2010/main" val="0"/>
+                  </a:ext>
+                </a:extLst>
+              </a:blip>
+              <a:srcRect r="19390"/>
+              <a:stretch/>
+            </p:blipFill>
+            <p:spPr bwMode="auto">
+              <a:xfrm>
+                <a:off x="3847318" y="3075605"/>
+                <a:ext cx="6082687" cy="2011680"/>
+              </a:xfrm>
+              <a:prstGeom prst="rect">
+                <a:avLst/>
+              </a:prstGeom>
+              <a:ln>
+                <a:noFill/>
+              </a:ln>
+              <a:extLst>
+                <a:ext uri="{53640926-AAD7-44D8-BBD7-CCE9431645EC}">
+                  <a14:shadowObscured xmlns:a14="http://schemas.microsoft.com/office/drawing/2010/main"/>
+                </a:ext>
+              </a:extLst>
+            </p:spPr>
+          </p:pic>
+          <p:pic>
+            <p:nvPicPr>
+              <p:cNvPr id="9" name="Picture 8" descr="A graph of a graph showing different types of molecules&#10;&#10;Description automatically generated with medium confidence">
+                <a:extLst>
+                  <a:ext uri="{FF2B5EF4-FFF2-40B4-BE49-F238E27FC236}">
+                    <a16:creationId xmlns:a16="http://schemas.microsoft.com/office/drawing/2014/main" id="{36BC33F8-0537-57E8-6D55-C967E5E8E207}"/>
+                  </a:ext>
+                </a:extLst>
+              </p:cNvPr>
+              <p:cNvPicPr>
+                <a:picLocks noChangeAspect="1"/>
+              </p:cNvPicPr>
+              <p:nvPr/>
+            </p:nvPicPr>
+            <p:blipFill rotWithShape="1">
+              <a:blip r:embed="rId2" cstate="print">
+                <a:extLst>
+                  <a:ext uri="{28A0092B-C50C-407E-A947-70E740481C1C}">
+                    <a14:useLocalDpi xmlns:a14="http://schemas.microsoft.com/office/drawing/2010/main" val="0"/>
+                  </a:ext>
+                </a:extLst>
+              </a:blip>
+              <a:srcRect l="84422" r="10577"/>
+              <a:stretch/>
+            </p:blipFill>
+            <p:spPr bwMode="auto">
+              <a:xfrm>
+                <a:off x="9939070" y="3067271"/>
+                <a:ext cx="377405" cy="2011680"/>
+              </a:xfrm>
+              <a:prstGeom prst="rect">
+                <a:avLst/>
+              </a:prstGeom>
+              <a:ln>
+                <a:noFill/>
+              </a:ln>
+              <a:extLst>
+                <a:ext uri="{53640926-AAD7-44D8-BBD7-CCE9431645EC}">
+                  <a14:shadowObscured xmlns:a14="http://schemas.microsoft.com/office/drawing/2010/main"/>
+                </a:ext>
+              </a:extLst>
+            </p:spPr>
+          </p:pic>
+        </p:grpSp>
         <p:pic>
           <p:nvPicPr>
-            <p:cNvPr id="4" name="Picture 3" descr="A graph of a graph showing different types of molecules&#10;&#10;Description automatically generated with medium confidence">
+            <p:cNvPr id="5" name="Picture 4" descr="A table with numbers and letters&#10;&#10;Description automatically generated">
               <a:extLst>
                 <a:ext uri="{FF2B5EF4-FFF2-40B4-BE49-F238E27FC236}">
-                  <a16:creationId xmlns:a16="http://schemas.microsoft.com/office/drawing/2014/main" id="{25EAF043-CFC7-AB29-1AB6-FF1573252C10}"/>
+                  <a16:creationId xmlns:a16="http://schemas.microsoft.com/office/drawing/2014/main" id="{A59C59C0-9C5E-3941-6784-E78043FC1EE7}"/>
                 </a:ext>
               </a:extLst>
             </p:cNvPr>
@@ -4953,20 +4962,20 @@
             <p:nvPr/>
           </p:nvPicPr>
           <p:blipFill rotWithShape="1">
-            <a:blip r:embed="rId3" cstate="print">
+            <a:blip r:embed="rId3">
               <a:extLst>
                 <a:ext uri="{28A0092B-C50C-407E-A947-70E740481C1C}">
                   <a14:useLocalDpi xmlns:a14="http://schemas.microsoft.com/office/drawing/2010/main" val="0"/>
                 </a:ext>
               </a:extLst>
             </a:blip>
-            <a:srcRect r="19390"/>
+            <a:srcRect r="25590"/>
             <a:stretch/>
           </p:blipFill>
           <p:spPr bwMode="auto">
             <a:xfrm>
-              <a:off x="5693342" y="1806063"/>
-              <a:ext cx="5529715" cy="1828800"/>
+              <a:off x="1134962" y="3075605"/>
+              <a:ext cx="3609596" cy="1530019"/>
             </a:xfrm>
             <a:prstGeom prst="rect">
               <a:avLst/>
@@ -4981,93 +4990,43 @@
             </a:extLst>
           </p:spPr>
         </p:pic>
-        <p:pic>
-          <p:nvPicPr>
-            <p:cNvPr id="9" name="Picture 8" descr="A graph of a graph showing different types of molecules&#10;&#10;Description automatically generated with medium confidence">
+        <p:sp>
+          <p:nvSpPr>
+            <p:cNvPr id="7" name="TextBox 6">
               <a:extLst>
                 <a:ext uri="{FF2B5EF4-FFF2-40B4-BE49-F238E27FC236}">
-                  <a16:creationId xmlns:a16="http://schemas.microsoft.com/office/drawing/2014/main" id="{36BC33F8-0537-57E8-6D55-C967E5E8E207}"/>
+                  <a16:creationId xmlns:a16="http://schemas.microsoft.com/office/drawing/2014/main" id="{229F823D-322A-5FFF-E21C-7CC321978D7F}"/>
                 </a:ext>
               </a:extLst>
             </p:cNvPr>
-            <p:cNvPicPr>
-              <a:picLocks noChangeAspect="1"/>
-            </p:cNvPicPr>
+            <p:cNvSpPr txBox="1"/>
             <p:nvPr/>
-          </p:nvPicPr>
-          <p:blipFill rotWithShape="1">
-            <a:blip r:embed="rId3" cstate="print">
-              <a:extLst>
-                <a:ext uri="{28A0092B-C50C-407E-A947-70E740481C1C}">
-                  <a14:useLocalDpi xmlns:a14="http://schemas.microsoft.com/office/drawing/2010/main" val="0"/>
-                </a:ext>
-              </a:extLst>
-            </a:blip>
-            <a:srcRect l="84422" r="10577"/>
-            <a:stretch/>
-          </p:blipFill>
-          <p:spPr bwMode="auto">
+          </p:nvSpPr>
+          <p:spPr>
             <a:xfrm>
-              <a:off x="11223057" y="1806063"/>
-              <a:ext cx="343095" cy="1828800"/>
+              <a:off x="844816" y="2349761"/>
+              <a:ext cx="4189888" cy="646331"/>
             </a:xfrm>
             <a:prstGeom prst="rect">
               <a:avLst/>
             </a:prstGeom>
-            <a:ln>
-              <a:noFill/>
-            </a:ln>
-            <a:extLst>
-              <a:ext uri="{53640926-AAD7-44D8-BBD7-CCE9431645EC}">
-                <a14:shadowObscured xmlns:a14="http://schemas.microsoft.com/office/drawing/2010/main"/>
-              </a:ext>
-            </a:extLst>
+            <a:noFill/>
           </p:spPr>
-        </p:pic>
+          <p:txBody>
+            <a:bodyPr wrap="square" rtlCol="0">
+              <a:spAutoFit/>
+            </a:bodyPr>
+            <a:lstStyle/>
+            <a:p>
+              <a:pPr algn="ctr"/>
+              <a:r>
+                <a:rPr lang="en-US" dirty="0"/>
+                <a:t>Amino Acid Positions Contributing the Most to Correlated Principal Components </a:t>
+              </a:r>
+            </a:p>
+          </p:txBody>
+        </p:sp>
       </p:grpSp>
-      <p:pic>
-        <p:nvPicPr>
-          <p:cNvPr id="12" name="Picture 11" descr="A blue dot diagram with white text&#10;&#10;Description automatically generated with medium confidence">
-            <a:extLst>
-              <a:ext uri="{FF2B5EF4-FFF2-40B4-BE49-F238E27FC236}">
-                <a16:creationId xmlns:a16="http://schemas.microsoft.com/office/drawing/2014/main" id="{71D24ACC-A528-05D2-CF8B-4E4C1E73E846}"/>
-              </a:ext>
-            </a:extLst>
-          </p:cNvPr>
-          <p:cNvPicPr>
-            <a:picLocks noChangeAspect="1"/>
-          </p:cNvPicPr>
-          <p:nvPr/>
-        </p:nvPicPr>
-        <p:blipFill rotWithShape="1">
-          <a:blip r:embed="rId4" cstate="print">
-            <a:extLst>
-              <a:ext uri="{28A0092B-C50C-407E-A947-70E740481C1C}">
-                <a14:useLocalDpi xmlns:a14="http://schemas.microsoft.com/office/drawing/2010/main" val="0"/>
-              </a:ext>
-            </a:extLst>
-          </a:blip>
-          <a:srcRect l="5183" t="10112" r="8692"/>
-          <a:stretch/>
-        </p:blipFill>
-        <p:spPr bwMode="auto">
-          <a:xfrm>
-            <a:off x="7085848" y="2494565"/>
-            <a:ext cx="4924677" cy="3083733"/>
-          </a:xfrm>
-          <a:prstGeom prst="rect">
-            <a:avLst/>
-          </a:prstGeom>
-          <a:ln>
-            <a:noFill/>
-          </a:ln>
-          <a:extLst>
-            <a:ext uri="{53640926-AAD7-44D8-BBD7-CCE9431645EC}">
-              <a14:shadowObscured xmlns:a14="http://schemas.microsoft.com/office/drawing/2010/main"/>
-            </a:ext>
-          </a:extLst>
-        </p:spPr>
-      </p:pic>
     </p:spTree>
     <p:extLst>
       <p:ext uri="{BB962C8B-B14F-4D97-AF65-F5344CB8AC3E}">
@@ -5081,7 +5040,7 @@
 </p:sld>
 </file>
 
-<file path=ppt/slides/slide6.xml><?xml version="1.0" encoding="utf-8"?>
+<file path=ppt/slides/slide5.xml><?xml version="1.0" encoding="utf-8"?>
 <p:sld xmlns:a="http://schemas.openxmlformats.org/drawingml/2006/main" xmlns:r="http://schemas.openxmlformats.org/officeDocument/2006/relationships" xmlns:p="http://schemas.openxmlformats.org/presentationml/2006/main">
   <p:cSld>
     <p:spTree>

</xml_diff>